<commit_message>
data folder update, ppt and readme update
</commit_message>
<xml_diff>
--- a/documents/PPT.pptx
+++ b/documents/PPT.pptx
@@ -20,8 +20,7 @@
     <p:sldId id="268" r:id="rId14"/>
     <p:sldId id="269" r:id="rId15"/>
     <p:sldId id="270" r:id="rId16"/>
-    <p:sldId id="271" r:id="rId17"/>
-    <p:sldId id="272" r:id="rId18"/>
+    <p:sldId id="272" r:id="rId17"/>
   </p:sldIdLst>
   <p:sldSz cx="12192000" cy="6858000"/>
   <p:notesSz cx="6858000" cy="9144000"/>
@@ -120,6 +119,11 @@
       </a:defRPr>
     </a:lvl9pPr>
   </p:defaultTextStyle>
+  <p:extLst>
+    <p:ext uri="{EFAFB233-063F-42B5-8137-9DF3F51BA10A}">
+      <p15:sldGuideLst xmlns:p15="http://schemas.microsoft.com/office/powerpoint/2012/main"/>
+    </p:ext>
+  </p:extLst>
 </p:presentation>
 </file>
 
@@ -218,7 +222,7 @@
           <a:effectLst/>
           <a:extLst>
             <a:ext uri="{91240B29-F687-4f45-9708-019B960494DF}">
-              <a14:hiddenLine xmlns:a14="http://schemas.microsoft.com/office/drawing/2010/main" xmlns="" w="9525">
+              <a14:hiddenLine xmlns="" xmlns:a14="http://schemas.microsoft.com/office/drawing/2010/main" w="9525">
                 <a:solidFill>
                   <a:srgbClr val="000000"/>
                 </a:solidFill>
@@ -411,7 +415,7 @@
             <a:fld id="{08B9EBBA-996F-894A-B54A-D6246ED52CEA}" type="datetimeFigureOut">
               <a:rPr lang="en-US" dirty="0"/>
               <a:pPr/>
-              <a:t>4/16/25</a:t>
+              <a:t>4/21/25</a:t>
             </a:fld>
             <a:endParaRPr lang="en-US" dirty="0"/>
           </a:p>
@@ -726,7 +730,7 @@
             <a:fld id="{18C79C5D-2A6F-F04D-97DA-BEF2467B64E4}" type="datetimeFigureOut">
               <a:rPr lang="en-US" dirty="0"/>
               <a:pPr/>
-              <a:t>4/16/25</a:t>
+              <a:t>4/21/25</a:t>
             </a:fld>
             <a:endParaRPr lang="en-US" dirty="0"/>
           </a:p>
@@ -1211,7 +1215,7 @@
             <a:fld id="{8DFA1846-DA80-1C48-A609-854EA85C59AD}" type="datetimeFigureOut">
               <a:rPr lang="en-US" dirty="0"/>
               <a:pPr/>
-              <a:t>4/16/25</a:t>
+              <a:t>4/21/25</a:t>
             </a:fld>
             <a:endParaRPr lang="en-US" dirty="0"/>
           </a:p>
@@ -1577,7 +1581,7 @@
             <a:fld id="{FBF54567-0DE4-3F47-BF90-CB84690072F9}" type="datetimeFigureOut">
               <a:rPr lang="en-US" dirty="0"/>
               <a:pPr/>
-              <a:t>4/16/25</a:t>
+              <a:t>4/21/25</a:t>
             </a:fld>
             <a:endParaRPr lang="en-US" dirty="0"/>
           </a:p>
@@ -1728,7 +1732,7 @@
           <a:ln/>
           <a:extLst>
             <a:ext uri="{91240B29-F687-4f45-9708-019B960494DF}">
-              <a14:hiddenLine xmlns:a14="http://schemas.microsoft.com/office/drawing/2010/main" xmlns="" w="9525">
+              <a14:hiddenLine xmlns="" xmlns:a14="http://schemas.microsoft.com/office/drawing/2010/main" w="9525">
                 <a:solidFill>
                   <a:srgbClr val="000000"/>
                 </a:solidFill>
@@ -1847,7 +1851,7 @@
             <a:fld id="{C6C52C72-DE31-F449-A4ED-4C594FD91407}" type="datetimeFigureOut">
               <a:rPr lang="en-US" dirty="0"/>
               <a:pPr/>
-              <a:t>4/16/25</a:t>
+              <a:t>4/21/25</a:t>
             </a:fld>
             <a:endParaRPr lang="en-US" dirty="0"/>
           </a:p>
@@ -2000,7 +2004,7 @@
           <a:ln/>
           <a:extLst>
             <a:ext uri="{91240B29-F687-4f45-9708-019B960494DF}">
-              <a14:hiddenLine xmlns:a14="http://schemas.microsoft.com/office/drawing/2010/main" xmlns="" w="9525">
+              <a14:hiddenLine xmlns="" xmlns:a14="http://schemas.microsoft.com/office/drawing/2010/main" w="9525">
                 <a:solidFill>
                   <a:srgbClr val="000000"/>
                 </a:solidFill>
@@ -2129,7 +2133,7 @@
             <a:fld id="{ED62726E-379B-B349-9EED-81ED093FA806}" type="datetimeFigureOut">
               <a:rPr lang="en-US" dirty="0"/>
               <a:pPr/>
-              <a:t>4/16/25</a:t>
+              <a:t>4/21/25</a:t>
             </a:fld>
             <a:endParaRPr lang="en-US" dirty="0"/>
           </a:p>
@@ -2280,7 +2284,7 @@
           <a:ln/>
           <a:extLst>
             <a:ext uri="{91240B29-F687-4f45-9708-019B960494DF}">
-              <a14:hiddenLine xmlns:a14="http://schemas.microsoft.com/office/drawing/2010/main" xmlns="" w="9525">
+              <a14:hiddenLine xmlns="" xmlns:a14="http://schemas.microsoft.com/office/drawing/2010/main" w="9525">
                 <a:solidFill>
                   <a:srgbClr val="000000"/>
                 </a:solidFill>
@@ -2409,7 +2413,7 @@
             <a:fld id="{9B3A1323-8D79-1946-B0D7-40001CF92E9D}" type="datetimeFigureOut">
               <a:rPr lang="en-US" dirty="0"/>
               <a:pPr/>
-              <a:t>4/16/25</a:t>
+              <a:t>4/21/25</a:t>
             </a:fld>
             <a:endParaRPr lang="en-US" dirty="0"/>
           </a:p>
@@ -2749,7 +2753,7 @@
             <a:fld id="{8DFA1846-DA80-1C48-A609-854EA85C59AD}" type="datetimeFigureOut">
               <a:rPr lang="en-US" dirty="0"/>
               <a:pPr/>
-              <a:t>4/16/25</a:t>
+              <a:t>4/21/25</a:t>
             </a:fld>
             <a:endParaRPr lang="en-US" dirty="0"/>
           </a:p>
@@ -2900,7 +2904,7 @@
           <a:ln/>
           <a:extLst>
             <a:ext uri="{91240B29-F687-4f45-9708-019B960494DF}">
-              <a14:hiddenLine xmlns:a14="http://schemas.microsoft.com/office/drawing/2010/main" xmlns="" w="9525">
+              <a14:hiddenLine xmlns="" xmlns:a14="http://schemas.microsoft.com/office/drawing/2010/main" w="9525">
                 <a:solidFill>
                   <a:srgbClr val="000000"/>
                 </a:solidFill>
@@ -3085,7 +3089,7 @@
             <a:fld id="{57302355-E14B-8545-A8F8-0FE83CC9D524}" type="datetimeFigureOut">
               <a:rPr lang="en-US" dirty="0"/>
               <a:pPr/>
-              <a:t>4/16/25</a:t>
+              <a:t>4/21/25</a:t>
             </a:fld>
             <a:endParaRPr lang="en-US" dirty="0"/>
           </a:p>
@@ -3236,7 +3240,7 @@
           <a:ln/>
           <a:extLst>
             <a:ext uri="{91240B29-F687-4f45-9708-019B960494DF}">
-              <a14:hiddenLine xmlns:a14="http://schemas.microsoft.com/office/drawing/2010/main" xmlns="" w="9525">
+              <a14:hiddenLine xmlns="" xmlns:a14="http://schemas.microsoft.com/office/drawing/2010/main" w="9525">
                 <a:solidFill>
                   <a:srgbClr val="000000"/>
                 </a:solidFill>
@@ -3559,7 +3563,7 @@
             <a:fld id="{02640F58-564D-2B4F-AE67-E407BA4FCF45}" type="datetimeFigureOut">
               <a:rPr lang="en-US" dirty="0"/>
               <a:pPr/>
-              <a:t>4/16/25</a:t>
+              <a:t>4/21/25</a:t>
             </a:fld>
             <a:endParaRPr lang="en-US" dirty="0"/>
           </a:p>
@@ -3710,7 +3714,7 @@
           <a:ln/>
           <a:extLst>
             <a:ext uri="{91240B29-F687-4f45-9708-019B960494DF}">
-              <a14:hiddenLine xmlns:a14="http://schemas.microsoft.com/office/drawing/2010/main" xmlns="" w="9525">
+              <a14:hiddenLine xmlns="" xmlns:a14="http://schemas.microsoft.com/office/drawing/2010/main" w="9525">
                 <a:solidFill>
                   <a:srgbClr val="000000"/>
                 </a:solidFill>
@@ -3777,7 +3781,7 @@
             <a:fld id="{F13A34C8-038E-2045-AF43-DF7DBB8E0E9E}" type="datetimeFigureOut">
               <a:rPr lang="en-US" dirty="0"/>
               <a:pPr/>
-              <a:t>4/16/25</a:t>
+              <a:t>4/21/25</a:t>
             </a:fld>
             <a:endParaRPr lang="en-US" dirty="0"/>
           </a:p>
@@ -3869,7 +3873,7 @@
             <a:fld id="{8818C68F-D26B-8F47-958C-23B49CF8A634}" type="datetimeFigureOut">
               <a:rPr lang="en-US" dirty="0"/>
               <a:pPr/>
-              <a:t>4/16/25</a:t>
+              <a:t>4/21/25</a:t>
             </a:fld>
             <a:endParaRPr lang="en-US" dirty="0"/>
           </a:p>
@@ -4133,7 +4137,7 @@
           <a:ln/>
           <a:extLst>
             <a:ext uri="{91240B29-F687-4f45-9708-019B960494DF}">
-              <a14:hiddenLine xmlns:a14="http://schemas.microsoft.com/office/drawing/2010/main" xmlns="" w="9525">
+              <a14:hiddenLine xmlns="" xmlns:a14="http://schemas.microsoft.com/office/drawing/2010/main" w="9525">
                 <a:solidFill>
                   <a:srgbClr val="000000"/>
                 </a:solidFill>
@@ -4333,7 +4337,7 @@
             <a:fld id="{D0DF5E60-9974-AC48-9591-99C2BB44B7CF}" type="datetimeFigureOut">
               <a:rPr lang="en-US" dirty="0"/>
               <a:pPr/>
-              <a:t>4/16/25</a:t>
+              <a:t>4/21/25</a:t>
             </a:fld>
             <a:endParaRPr lang="en-US" dirty="0"/>
           </a:p>
@@ -4643,7 +4647,7 @@
             <a:fld id="{18C79C5D-2A6F-F04D-97DA-BEF2467B64E4}" type="datetimeFigureOut">
               <a:rPr lang="en-US" dirty="0"/>
               <a:pPr/>
-              <a:t>4/16/25</a:t>
+              <a:t>4/21/25</a:t>
             </a:fld>
             <a:endParaRPr lang="en-US" dirty="0"/>
           </a:p>
@@ -4910,7 +4914,7 @@
             <a:fld id="{09B482E8-6E0E-1B4F-B1FD-C69DB9E858D9}" type="datetimeFigureOut">
               <a:rPr lang="en-US" dirty="0"/>
               <a:pPr/>
-              <a:t>4/16/25</a:t>
+              <a:t>4/21/25</a:t>
             </a:fld>
             <a:endParaRPr lang="en-US" dirty="0"/>
           </a:p>
@@ -6535,86 +6539,6 @@
           <p:cNvPr id="2" name="Title 1">
             <a:extLst>
               <a:ext uri="{FF2B5EF4-FFF2-40B4-BE49-F238E27FC236}">
-                <a16:creationId xmlns:a16="http://schemas.microsoft.com/office/drawing/2014/main" id="{53C17500-E95D-96FC-5B8B-E1FE6483DB4E}"/>
-              </a:ext>
-            </a:extLst>
-          </p:cNvPr>
-          <p:cNvSpPr>
-            <a:spLocks noGrp="1"/>
-          </p:cNvSpPr>
-          <p:nvPr>
-            <p:ph type="title"/>
-          </p:nvPr>
-        </p:nvSpPr>
-        <p:spPr/>
-        <p:txBody>
-          <a:bodyPr/>
-          <a:lstStyle/>
-          <a:p>
-            <a:endParaRPr lang="en-US"/>
-          </a:p>
-        </p:txBody>
-      </p:sp>
-      <p:sp>
-        <p:nvSpPr>
-          <p:cNvPr id="3" name="Content Placeholder 2">
-            <a:extLst>
-              <a:ext uri="{FF2B5EF4-FFF2-40B4-BE49-F238E27FC236}">
-                <a16:creationId xmlns:a16="http://schemas.microsoft.com/office/drawing/2014/main" id="{3EB089F9-5832-E124-28B7-CCB898816705}"/>
-              </a:ext>
-            </a:extLst>
-          </p:cNvPr>
-          <p:cNvSpPr>
-            <a:spLocks noGrp="1"/>
-          </p:cNvSpPr>
-          <p:nvPr>
-            <p:ph idx="1"/>
-          </p:nvPr>
-        </p:nvSpPr>
-        <p:spPr/>
-        <p:txBody>
-          <a:bodyPr/>
-          <a:lstStyle/>
-          <a:p>
-            <a:endParaRPr lang="en-US" dirty="0"/>
-          </a:p>
-        </p:txBody>
-      </p:sp>
-    </p:spTree>
-    <p:extLst>
-      <p:ext uri="{BB962C8B-B14F-4D97-AF65-F5344CB8AC3E}">
-        <p14:creationId xmlns:p14="http://schemas.microsoft.com/office/powerpoint/2010/main" val="1715716346"/>
-      </p:ext>
-    </p:extLst>
-  </p:cSld>
-  <p:clrMapOvr>
-    <a:masterClrMapping/>
-  </p:clrMapOvr>
-</p:sld>
-</file>
-
-<file path=ppt/slides/slide17.xml><?xml version="1.0" encoding="utf-8"?>
-<p:sld xmlns:a="http://schemas.openxmlformats.org/drawingml/2006/main" xmlns:r="http://schemas.openxmlformats.org/officeDocument/2006/relationships" xmlns:p="http://schemas.openxmlformats.org/presentationml/2006/main">
-  <p:cSld>
-    <p:spTree>
-      <p:nvGrpSpPr>
-        <p:cNvPr id="1" name=""/>
-        <p:cNvGrpSpPr/>
-        <p:nvPr/>
-      </p:nvGrpSpPr>
-      <p:grpSpPr>
-        <a:xfrm>
-          <a:off x="0" y="0"/>
-          <a:ext cx="0" cy="0"/>
-          <a:chOff x="0" y="0"/>
-          <a:chExt cx="0" cy="0"/>
-        </a:xfrm>
-      </p:grpSpPr>
-      <p:sp>
-        <p:nvSpPr>
-          <p:cNvPr id="2" name="Title 1">
-            <a:extLst>
-              <a:ext uri="{FF2B5EF4-FFF2-40B4-BE49-F238E27FC236}">
                 <a16:creationId xmlns:a16="http://schemas.microsoft.com/office/drawing/2014/main" id="{201319D7-AE9E-375C-391B-B9B6EDA317A3}"/>
               </a:ext>
             </a:extLst>

</xml_diff>